<commit_message>
Add CloudWatch to architecture
</commit_message>
<xml_diff>
--- a/docs/deployment_guide/images/architecture-diagram.pptx
+++ b/docs/deployment_guide/images/architecture-diagram.pptx
@@ -243,7 +243,7 @@
           <a:p>
             <a:fld id="{42CEB043-CB07-4D88-96C7-E080C34C29C0}" type="datetimeFigureOut">
               <a:rPr lang="en-US" smtClean="0"/>
-              <a:t>2022-06-16</a:t>
+              <a:t>2022-06-24</a:t>
             </a:fld>
             <a:endParaRPr lang="en-US"/>
           </a:p>
@@ -413,7 +413,7 @@
           <a:p>
             <a:fld id="{42CEB043-CB07-4D88-96C7-E080C34C29C0}" type="datetimeFigureOut">
               <a:rPr lang="en-US" smtClean="0"/>
-              <a:t>2022-06-16</a:t>
+              <a:t>2022-06-24</a:t>
             </a:fld>
             <a:endParaRPr lang="en-US"/>
           </a:p>
@@ -593,7 +593,7 @@
           <a:p>
             <a:fld id="{42CEB043-CB07-4D88-96C7-E080C34C29C0}" type="datetimeFigureOut">
               <a:rPr lang="en-US" smtClean="0"/>
-              <a:t>2022-06-16</a:t>
+              <a:t>2022-06-24</a:t>
             </a:fld>
             <a:endParaRPr lang="en-US"/>
           </a:p>
@@ -763,7 +763,7 @@
           <a:p>
             <a:fld id="{42CEB043-CB07-4D88-96C7-E080C34C29C0}" type="datetimeFigureOut">
               <a:rPr lang="en-US" smtClean="0"/>
-              <a:t>2022-06-16</a:t>
+              <a:t>2022-06-24</a:t>
             </a:fld>
             <a:endParaRPr lang="en-US"/>
           </a:p>
@@ -1007,7 +1007,7 @@
           <a:p>
             <a:fld id="{42CEB043-CB07-4D88-96C7-E080C34C29C0}" type="datetimeFigureOut">
               <a:rPr lang="en-US" smtClean="0"/>
-              <a:t>2022-06-16</a:t>
+              <a:t>2022-06-24</a:t>
             </a:fld>
             <a:endParaRPr lang="en-US"/>
           </a:p>
@@ -1239,7 +1239,7 @@
           <a:p>
             <a:fld id="{42CEB043-CB07-4D88-96C7-E080C34C29C0}" type="datetimeFigureOut">
               <a:rPr lang="en-US" smtClean="0"/>
-              <a:t>2022-06-16</a:t>
+              <a:t>2022-06-24</a:t>
             </a:fld>
             <a:endParaRPr lang="en-US"/>
           </a:p>
@@ -1606,7 +1606,7 @@
           <a:p>
             <a:fld id="{42CEB043-CB07-4D88-96C7-E080C34C29C0}" type="datetimeFigureOut">
               <a:rPr lang="en-US" smtClean="0"/>
-              <a:t>2022-06-16</a:t>
+              <a:t>2022-06-24</a:t>
             </a:fld>
             <a:endParaRPr lang="en-US"/>
           </a:p>
@@ -1724,7 +1724,7 @@
           <a:p>
             <a:fld id="{42CEB043-CB07-4D88-96C7-E080C34C29C0}" type="datetimeFigureOut">
               <a:rPr lang="en-US" smtClean="0"/>
-              <a:t>2022-06-16</a:t>
+              <a:t>2022-06-24</a:t>
             </a:fld>
             <a:endParaRPr lang="en-US"/>
           </a:p>
@@ -1819,7 +1819,7 @@
           <a:p>
             <a:fld id="{42CEB043-CB07-4D88-96C7-E080C34C29C0}" type="datetimeFigureOut">
               <a:rPr lang="en-US" smtClean="0"/>
-              <a:t>2022-06-16</a:t>
+              <a:t>2022-06-24</a:t>
             </a:fld>
             <a:endParaRPr lang="en-US"/>
           </a:p>
@@ -2096,7 +2096,7 @@
           <a:p>
             <a:fld id="{42CEB043-CB07-4D88-96C7-E080C34C29C0}" type="datetimeFigureOut">
               <a:rPr lang="en-US" smtClean="0"/>
-              <a:t>2022-06-16</a:t>
+              <a:t>2022-06-24</a:t>
             </a:fld>
             <a:endParaRPr lang="en-US"/>
           </a:p>
@@ -2353,7 +2353,7 @@
           <a:p>
             <a:fld id="{42CEB043-CB07-4D88-96C7-E080C34C29C0}" type="datetimeFigureOut">
               <a:rPr lang="en-US" smtClean="0"/>
-              <a:t>2022-06-16</a:t>
+              <a:t>2022-06-24</a:t>
             </a:fld>
             <a:endParaRPr lang="en-US"/>
           </a:p>
@@ -2566,7 +2566,7 @@
           <a:p>
             <a:fld id="{42CEB043-CB07-4D88-96C7-E080C34C29C0}" type="datetimeFigureOut">
               <a:rPr lang="en-US" smtClean="0"/>
-              <a:t>2022-06-16</a:t>
+              <a:t>2022-06-24</a:t>
             </a:fld>
             <a:endParaRPr lang="en-US"/>
           </a:p>
@@ -7751,7 +7751,7 @@
         </p:blipFill>
         <p:spPr bwMode="auto">
           <a:xfrm>
-            <a:off x="11562682" y="2478423"/>
+            <a:off x="11562330" y="3997044"/>
             <a:ext cx="762000" cy="762000"/>
           </a:xfrm>
           <a:prstGeom prst="rect">
@@ -7798,7 +7798,7 @@
         </p:nvSpPr>
         <p:spPr bwMode="auto">
           <a:xfrm>
-            <a:off x="11052344" y="3246693"/>
+            <a:off x="11062652" y="4759044"/>
             <a:ext cx="1797931" cy="276999"/>
           </a:xfrm>
           <a:prstGeom prst="rect">
@@ -7972,7 +7972,7 @@
         </p:blipFill>
         <p:spPr bwMode="auto">
           <a:xfrm>
-            <a:off x="11562682" y="4248100"/>
+            <a:off x="11562330" y="5449612"/>
             <a:ext cx="762000" cy="762000"/>
           </a:xfrm>
           <a:prstGeom prst="rect">
@@ -8019,7 +8019,7 @@
         </p:nvSpPr>
         <p:spPr bwMode="auto">
           <a:xfrm>
-            <a:off x="11130595" y="5008770"/>
+            <a:off x="11127278" y="6208878"/>
             <a:ext cx="1633626" cy="276999"/>
           </a:xfrm>
           <a:prstGeom prst="rect">
@@ -8193,7 +8193,7 @@
         </p:blipFill>
         <p:spPr bwMode="auto">
           <a:xfrm>
-            <a:off x="11562330" y="6205727"/>
+            <a:off x="11562330" y="6894147"/>
             <a:ext cx="762000" cy="762000"/>
           </a:xfrm>
           <a:prstGeom prst="rect">
@@ -8240,7 +8240,7 @@
         </p:nvSpPr>
         <p:spPr bwMode="auto">
           <a:xfrm>
-            <a:off x="11367085" y="6967570"/>
+            <a:off x="11367085" y="7655990"/>
             <a:ext cx="1152680" cy="276999"/>
           </a:xfrm>
           <a:prstGeom prst="rect">
@@ -8703,6 +8703,227 @@
                 <a:cs typeface="Arial" panose="020B0604020202020204" pitchFamily="34" charset="0"/>
               </a:rPr>
               <a:t>Contour Envoy</a:t>
+            </a:r>
+          </a:p>
+        </p:txBody>
+      </p:sp>
+      <p:pic>
+        <p:nvPicPr>
+          <p:cNvPr id="70" name="Graphic 17">
+            <a:extLst>
+              <a:ext uri="{FF2B5EF4-FFF2-40B4-BE49-F238E27FC236}">
+                <a16:creationId xmlns:a16="http://schemas.microsoft.com/office/drawing/2014/main" id="{094DAA12-5015-4182-9006-DBE6E95BCB6D}"/>
+              </a:ext>
+            </a:extLst>
+          </p:cNvPr>
+          <p:cNvPicPr>
+            <a:picLocks noChangeAspect="1" noChangeArrowheads="1"/>
+          </p:cNvPicPr>
+          <p:nvPr/>
+        </p:nvPicPr>
+        <p:blipFill>
+          <a:blip r:embed="rId28">
+            <a:extLst>
+              <a:ext uri="{28A0092B-C50C-407E-A947-70E740481C1C}">
+                <a14:useLocalDpi xmlns:a14="http://schemas.microsoft.com/office/drawing/2010/main" val="0"/>
+              </a:ext>
+            </a:extLst>
+          </a:blip>
+          <a:srcRect/>
+          <a:stretch>
+            <a:fillRect/>
+          </a:stretch>
+        </p:blipFill>
+        <p:spPr bwMode="auto">
+          <a:xfrm>
+            <a:off x="11555416" y="2544143"/>
+            <a:ext cx="762000" cy="762000"/>
+          </a:xfrm>
+          <a:prstGeom prst="rect">
+            <a:avLst/>
+          </a:prstGeom>
+          <a:noFill/>
+          <a:ln>
+            <a:noFill/>
+          </a:ln>
+          <a:extLst>
+            <a:ext uri="{909E8E84-426E-40DD-AFC4-6F175D3DCCD1}">
+              <a14:hiddenFill xmlns:a14="http://schemas.microsoft.com/office/drawing/2010/main">
+                <a:solidFill>
+                  <a:srgbClr val="FFFFFF"/>
+                </a:solidFill>
+              </a14:hiddenFill>
+            </a:ext>
+            <a:ext uri="{91240B29-F687-4F45-9708-019B960494DF}">
+              <a14:hiddenLine xmlns:a14="http://schemas.microsoft.com/office/drawing/2010/main" w="9525">
+                <a:solidFill>
+                  <a:srgbClr val="000000"/>
+                </a:solidFill>
+                <a:miter lim="800000"/>
+                <a:headEnd/>
+                <a:tailEnd/>
+              </a14:hiddenLine>
+            </a:ext>
+          </a:extLst>
+        </p:spPr>
+      </p:pic>
+      <p:sp>
+        <p:nvSpPr>
+          <p:cNvPr id="71" name="TextBox 9">
+            <a:extLst>
+              <a:ext uri="{FF2B5EF4-FFF2-40B4-BE49-F238E27FC236}">
+                <a16:creationId xmlns:a16="http://schemas.microsoft.com/office/drawing/2014/main" id="{88D6BDF2-6B10-441A-AD16-E9EC92EC792D}"/>
+              </a:ext>
+            </a:extLst>
+          </p:cNvPr>
+          <p:cNvSpPr txBox="1">
+            <a:spLocks noChangeArrowheads="1"/>
+          </p:cNvSpPr>
+          <p:nvPr/>
+        </p:nvSpPr>
+        <p:spPr bwMode="auto">
+          <a:xfrm>
+            <a:off x="10815641" y="3306143"/>
+            <a:ext cx="2243137" cy="276999"/>
+          </a:xfrm>
+          <a:prstGeom prst="rect">
+            <a:avLst/>
+          </a:prstGeom>
+          <a:noFill/>
+          <a:ln>
+            <a:noFill/>
+          </a:ln>
+          <a:extLst>
+            <a:ext uri="{909E8E84-426E-40DD-AFC4-6F175D3DCCD1}">
+              <a14:hiddenFill xmlns:a14="http://schemas.microsoft.com/office/drawing/2010/main">
+                <a:solidFill>
+                  <a:srgbClr val="FFFFFF"/>
+                </a:solidFill>
+              </a14:hiddenFill>
+            </a:ext>
+            <a:ext uri="{91240B29-F687-4F45-9708-019B960494DF}">
+              <a14:hiddenLine xmlns:a14="http://schemas.microsoft.com/office/drawing/2010/main" w="9525">
+                <a:solidFill>
+                  <a:srgbClr val="000000"/>
+                </a:solidFill>
+                <a:miter lim="800000"/>
+                <a:headEnd/>
+                <a:tailEnd/>
+              </a14:hiddenLine>
+            </a:ext>
+          </a:extLst>
+        </p:spPr>
+        <p:txBody>
+          <a:bodyPr>
+            <a:spAutoFit/>
+          </a:bodyPr>
+          <a:lstStyle>
+            <a:lvl1pPr>
+              <a:defRPr>
+                <a:solidFill>
+                  <a:schemeClr val="tx1"/>
+                </a:solidFill>
+                <a:latin typeface="Calibri" panose="020F0502020204030204" pitchFamily="34" charset="0"/>
+              </a:defRPr>
+            </a:lvl1pPr>
+            <a:lvl2pPr marL="742950" indent="-285750">
+              <a:defRPr>
+                <a:solidFill>
+                  <a:schemeClr val="tx1"/>
+                </a:solidFill>
+                <a:latin typeface="Calibri" panose="020F0502020204030204" pitchFamily="34" charset="0"/>
+              </a:defRPr>
+            </a:lvl2pPr>
+            <a:lvl3pPr marL="1143000" indent="-228600">
+              <a:defRPr>
+                <a:solidFill>
+                  <a:schemeClr val="tx1"/>
+                </a:solidFill>
+                <a:latin typeface="Calibri" panose="020F0502020204030204" pitchFamily="34" charset="0"/>
+              </a:defRPr>
+            </a:lvl3pPr>
+            <a:lvl4pPr marL="1600200" indent="-228600">
+              <a:defRPr>
+                <a:solidFill>
+                  <a:schemeClr val="tx1"/>
+                </a:solidFill>
+                <a:latin typeface="Calibri" panose="020F0502020204030204" pitchFamily="34" charset="0"/>
+              </a:defRPr>
+            </a:lvl4pPr>
+            <a:lvl5pPr marL="2057400" indent="-228600">
+              <a:defRPr>
+                <a:solidFill>
+                  <a:schemeClr val="tx1"/>
+                </a:solidFill>
+                <a:latin typeface="Calibri" panose="020F0502020204030204" pitchFamily="34" charset="0"/>
+              </a:defRPr>
+            </a:lvl5pPr>
+            <a:lvl6pPr marL="2514600" indent="-228600" eaLnBrk="0" fontAlgn="base" hangingPunct="0">
+              <a:spcBef>
+                <a:spcPct val="0"/>
+              </a:spcBef>
+              <a:spcAft>
+                <a:spcPct val="0"/>
+              </a:spcAft>
+              <a:defRPr>
+                <a:solidFill>
+                  <a:schemeClr val="tx1"/>
+                </a:solidFill>
+                <a:latin typeface="Calibri" panose="020F0502020204030204" pitchFamily="34" charset="0"/>
+              </a:defRPr>
+            </a:lvl6pPr>
+            <a:lvl7pPr marL="2971800" indent="-228600" eaLnBrk="0" fontAlgn="base" hangingPunct="0">
+              <a:spcBef>
+                <a:spcPct val="0"/>
+              </a:spcBef>
+              <a:spcAft>
+                <a:spcPct val="0"/>
+              </a:spcAft>
+              <a:defRPr>
+                <a:solidFill>
+                  <a:schemeClr val="tx1"/>
+                </a:solidFill>
+                <a:latin typeface="Calibri" panose="020F0502020204030204" pitchFamily="34" charset="0"/>
+              </a:defRPr>
+            </a:lvl7pPr>
+            <a:lvl8pPr marL="3429000" indent="-228600" eaLnBrk="0" fontAlgn="base" hangingPunct="0">
+              <a:spcBef>
+                <a:spcPct val="0"/>
+              </a:spcBef>
+              <a:spcAft>
+                <a:spcPct val="0"/>
+              </a:spcAft>
+              <a:defRPr>
+                <a:solidFill>
+                  <a:schemeClr val="tx1"/>
+                </a:solidFill>
+                <a:latin typeface="Calibri" panose="020F0502020204030204" pitchFamily="34" charset="0"/>
+              </a:defRPr>
+            </a:lvl8pPr>
+            <a:lvl9pPr marL="3886200" indent="-228600" eaLnBrk="0" fontAlgn="base" hangingPunct="0">
+              <a:spcBef>
+                <a:spcPct val="0"/>
+              </a:spcBef>
+              <a:spcAft>
+                <a:spcPct val="0"/>
+              </a:spcAft>
+              <a:defRPr>
+                <a:solidFill>
+                  <a:schemeClr val="tx1"/>
+                </a:solidFill>
+                <a:latin typeface="Calibri" panose="020F0502020204030204" pitchFamily="34" charset="0"/>
+              </a:defRPr>
+            </a:lvl9pPr>
+          </a:lstStyle>
+          <a:p>
+            <a:pPr algn="ctr" eaLnBrk="1" hangingPunct="1"/>
+            <a:r>
+              <a:rPr lang="en-US" altLang="en-US" sz="1200" dirty="0">
+                <a:latin typeface="Arial" panose="020B0604020202020204" pitchFamily="34" charset="0"/>
+                <a:ea typeface="Amazon Ember" panose="020B0603020204020204" pitchFamily="34" charset="0"/>
+                <a:cs typeface="Arial" panose="020B0604020202020204" pitchFamily="34" charset="0"/>
+              </a:rPr>
+              <a:t>Amazon CloudWatch</a:t>
             </a:r>
           </a:p>
         </p:txBody>

</xml_diff>

<commit_message>
Update to reflect consolidating 2 CLBs to 1 NLB
</commit_message>
<xml_diff>
--- a/docs/deployment_guide/images/architecture-diagram.pptx
+++ b/docs/deployment_guide/images/architecture-diagram.pptx
@@ -243,7 +243,7 @@
           <a:p>
             <a:fld id="{42CEB043-CB07-4D88-96C7-E080C34C29C0}" type="datetimeFigureOut">
               <a:rPr lang="en-US" smtClean="0"/>
-              <a:t>2022-06-24</a:t>
+              <a:t>2022-06-29</a:t>
             </a:fld>
             <a:endParaRPr lang="en-US"/>
           </a:p>
@@ -413,7 +413,7 @@
           <a:p>
             <a:fld id="{42CEB043-CB07-4D88-96C7-E080C34C29C0}" type="datetimeFigureOut">
               <a:rPr lang="en-US" smtClean="0"/>
-              <a:t>2022-06-24</a:t>
+              <a:t>2022-06-29</a:t>
             </a:fld>
             <a:endParaRPr lang="en-US"/>
           </a:p>
@@ -593,7 +593,7 @@
           <a:p>
             <a:fld id="{42CEB043-CB07-4D88-96C7-E080C34C29C0}" type="datetimeFigureOut">
               <a:rPr lang="en-US" smtClean="0"/>
-              <a:t>2022-06-24</a:t>
+              <a:t>2022-06-29</a:t>
             </a:fld>
             <a:endParaRPr lang="en-US"/>
           </a:p>
@@ -763,7 +763,7 @@
           <a:p>
             <a:fld id="{42CEB043-CB07-4D88-96C7-E080C34C29C0}" type="datetimeFigureOut">
               <a:rPr lang="en-US" smtClean="0"/>
-              <a:t>2022-06-24</a:t>
+              <a:t>2022-06-29</a:t>
             </a:fld>
             <a:endParaRPr lang="en-US"/>
           </a:p>
@@ -1007,7 +1007,7 @@
           <a:p>
             <a:fld id="{42CEB043-CB07-4D88-96C7-E080C34C29C0}" type="datetimeFigureOut">
               <a:rPr lang="en-US" smtClean="0"/>
-              <a:t>2022-06-24</a:t>
+              <a:t>2022-06-29</a:t>
             </a:fld>
             <a:endParaRPr lang="en-US"/>
           </a:p>
@@ -1239,7 +1239,7 @@
           <a:p>
             <a:fld id="{42CEB043-CB07-4D88-96C7-E080C34C29C0}" type="datetimeFigureOut">
               <a:rPr lang="en-US" smtClean="0"/>
-              <a:t>2022-06-24</a:t>
+              <a:t>2022-06-29</a:t>
             </a:fld>
             <a:endParaRPr lang="en-US"/>
           </a:p>
@@ -1606,7 +1606,7 @@
           <a:p>
             <a:fld id="{42CEB043-CB07-4D88-96C7-E080C34C29C0}" type="datetimeFigureOut">
               <a:rPr lang="en-US" smtClean="0"/>
-              <a:t>2022-06-24</a:t>
+              <a:t>2022-06-29</a:t>
             </a:fld>
             <a:endParaRPr lang="en-US"/>
           </a:p>
@@ -1724,7 +1724,7 @@
           <a:p>
             <a:fld id="{42CEB043-CB07-4D88-96C7-E080C34C29C0}" type="datetimeFigureOut">
               <a:rPr lang="en-US" smtClean="0"/>
-              <a:t>2022-06-24</a:t>
+              <a:t>2022-06-29</a:t>
             </a:fld>
             <a:endParaRPr lang="en-US"/>
           </a:p>
@@ -1819,7 +1819,7 @@
           <a:p>
             <a:fld id="{42CEB043-CB07-4D88-96C7-E080C34C29C0}" type="datetimeFigureOut">
               <a:rPr lang="en-US" smtClean="0"/>
-              <a:t>2022-06-24</a:t>
+              <a:t>2022-06-29</a:t>
             </a:fld>
             <a:endParaRPr lang="en-US"/>
           </a:p>
@@ -2096,7 +2096,7 @@
           <a:p>
             <a:fld id="{42CEB043-CB07-4D88-96C7-E080C34C29C0}" type="datetimeFigureOut">
               <a:rPr lang="en-US" smtClean="0"/>
-              <a:t>2022-06-24</a:t>
+              <a:t>2022-06-29</a:t>
             </a:fld>
             <a:endParaRPr lang="en-US"/>
           </a:p>
@@ -2353,7 +2353,7 @@
           <a:p>
             <a:fld id="{42CEB043-CB07-4D88-96C7-E080C34C29C0}" type="datetimeFigureOut">
               <a:rPr lang="en-US" smtClean="0"/>
-              <a:t>2022-06-24</a:t>
+              <a:t>2022-06-29</a:t>
             </a:fld>
             <a:endParaRPr lang="en-US"/>
           </a:p>
@@ -2566,7 +2566,7 @@
           <a:p>
             <a:fld id="{42CEB043-CB07-4D88-96C7-E080C34C29C0}" type="datetimeFigureOut">
               <a:rPr lang="en-US" smtClean="0"/>
-              <a:t>2022-06-24</a:t>
+              <a:t>2022-06-29</a:t>
             </a:fld>
             <a:endParaRPr lang="en-US"/>
           </a:p>
@@ -3912,22 +3912,30 @@
           <a:p>
             <a:pPr algn="ctr" eaLnBrk="1" hangingPunct="1"/>
             <a:r>
+              <a:rPr lang="en-US" altLang="en-US" sz="1100">
+                <a:latin typeface="Arial" panose="020B0604020202020204" pitchFamily="34" charset="0"/>
+                <a:ea typeface="Amazon Ember" panose="020B0603020204020204" pitchFamily="34" charset="0"/>
+                <a:cs typeface="Arial" panose="020B0604020202020204" pitchFamily="34" charset="0"/>
+              </a:rPr>
+              <a:t>Network </a:t>
+            </a:r>
+            <a:r>
               <a:rPr lang="en-US" altLang="en-US" sz="1100" dirty="0">
                 <a:latin typeface="Arial" panose="020B0604020202020204" pitchFamily="34" charset="0"/>
                 <a:ea typeface="Amazon Ember" panose="020B0603020204020204" pitchFamily="34" charset="0"/>
                 <a:cs typeface="Arial" panose="020B0604020202020204" pitchFamily="34" charset="0"/>
               </a:rPr>
-              <a:t>Classic Load Balancer</a:t>
+              <a:t>Load Balancer</a:t>
             </a:r>
           </a:p>
         </p:txBody>
       </p:sp>
       <p:pic>
         <p:nvPicPr>
-          <p:cNvPr id="88" name="Graphic 18">
+          <p:cNvPr id="89" name="Graphic 22">
             <a:extLst>
               <a:ext uri="{FF2B5EF4-FFF2-40B4-BE49-F238E27FC236}">
-                <a16:creationId xmlns:a16="http://schemas.microsoft.com/office/drawing/2014/main" id="{3BE70246-1737-4480-8F0C-46556F47D169}"/>
+                <a16:creationId xmlns:a16="http://schemas.microsoft.com/office/drawing/2014/main" id="{4FB97DFF-4614-4AF2-ADBB-BB4EF7F9F3BA}"/>
               </a:ext>
             </a:extLst>
           </p:cNvPr>
@@ -3939,20 +3947,18 @@
         <p:blipFill>
           <a:blip r:embed="rId11">
             <a:extLst>
-              <a:ext uri="{28A0092B-C50C-407E-A947-70E740481C1C}">
-                <a14:useLocalDpi xmlns:a14="http://schemas.microsoft.com/office/drawing/2010/main" val="0"/>
+              <a:ext uri="{96DAC541-7B7A-43D3-8B79-37D633B846F1}">
+                <asvg:svgBlip xmlns:asvg="http://schemas.microsoft.com/office/drawing/2016/SVG/main" r:embed="rId12"/>
               </a:ext>
             </a:extLst>
           </a:blip>
           <a:srcRect/>
-          <a:stretch>
-            <a:fillRect/>
-          </a:stretch>
+          <a:stretch/>
         </p:blipFill>
         <p:spPr bwMode="auto">
           <a:xfrm>
-            <a:off x="4655785" y="4136799"/>
-            <a:ext cx="457200" cy="457200"/>
+            <a:off x="728976" y="3315148"/>
+            <a:ext cx="469900" cy="469900"/>
           </a:xfrm>
           <a:prstGeom prst="rect">
             <a:avLst/>
@@ -3984,10 +3990,10 @@
       </p:pic>
       <p:pic>
         <p:nvPicPr>
-          <p:cNvPr id="89" name="Graphic 22">
+          <p:cNvPr id="90" name="Graphic 23">
             <a:extLst>
               <a:ext uri="{FF2B5EF4-FFF2-40B4-BE49-F238E27FC236}">
-                <a16:creationId xmlns:a16="http://schemas.microsoft.com/office/drawing/2014/main" id="{4FB97DFF-4614-4AF2-ADBB-BB4EF7F9F3BA}"/>
+                <a16:creationId xmlns:a16="http://schemas.microsoft.com/office/drawing/2014/main" id="{9525891A-3729-4E1F-8AB9-3997F62B8BD9}"/>
               </a:ext>
             </a:extLst>
           </p:cNvPr>
@@ -3997,10 +4003,10 @@
           <p:nvPr/>
         </p:nvPicPr>
         <p:blipFill>
-          <a:blip r:embed="rId12">
+          <a:blip r:embed="rId13">
             <a:extLst>
               <a:ext uri="{96DAC541-7B7A-43D3-8B79-37D633B846F1}">
-                <asvg:svgBlip xmlns:asvg="http://schemas.microsoft.com/office/drawing/2016/SVG/main" r:embed="rId13"/>
+                <asvg:svgBlip xmlns:asvg="http://schemas.microsoft.com/office/drawing/2016/SVG/main" r:embed="rId14"/>
               </a:ext>
             </a:extLst>
           </a:blip>
@@ -4008,8 +4014,8 @@
           <a:stretch/>
         </p:blipFill>
         <p:spPr bwMode="auto">
-          <a:xfrm>
-            <a:off x="728976" y="3315148"/>
+          <a:xfrm flipH="1">
+            <a:off x="728976" y="4127186"/>
             <a:ext cx="469900" cy="469900"/>
           </a:xfrm>
           <a:prstGeom prst="rect">
@@ -4040,35 +4046,24 @@
           </a:extLst>
         </p:spPr>
       </p:pic>
-      <p:pic>
-        <p:nvPicPr>
-          <p:cNvPr id="90" name="Graphic 23">
+      <p:sp>
+        <p:nvSpPr>
+          <p:cNvPr id="91" name="TextBox 39">
             <a:extLst>
               <a:ext uri="{FF2B5EF4-FFF2-40B4-BE49-F238E27FC236}">
-                <a16:creationId xmlns:a16="http://schemas.microsoft.com/office/drawing/2014/main" id="{9525891A-3729-4E1F-8AB9-3997F62B8BD9}"/>
+                <a16:creationId xmlns:a16="http://schemas.microsoft.com/office/drawing/2014/main" id="{46B93558-74DF-4C78-8B3B-26CE09B26DAF}"/>
               </a:ext>
             </a:extLst>
           </p:cNvPr>
-          <p:cNvPicPr>
-            <a:picLocks noChangeAspect="1" noChangeArrowheads="1"/>
-          </p:cNvPicPr>
+          <p:cNvSpPr txBox="1">
+            <a:spLocks noChangeArrowheads="1"/>
+          </p:cNvSpPr>
           <p:nvPr/>
-        </p:nvPicPr>
-        <p:blipFill>
-          <a:blip r:embed="rId14">
-            <a:extLst>
-              <a:ext uri="{96DAC541-7B7A-43D3-8B79-37D633B846F1}">
-                <asvg:svgBlip xmlns:asvg="http://schemas.microsoft.com/office/drawing/2016/SVG/main" r:embed="rId15"/>
-              </a:ext>
-            </a:extLst>
-          </a:blip>
-          <a:srcRect/>
-          <a:stretch/>
-        </p:blipFill>
+        </p:nvSpPr>
         <p:spPr bwMode="auto">
-          <a:xfrm flipH="1">
-            <a:off x="728976" y="4127186"/>
-            <a:ext cx="469900" cy="469900"/>
+          <a:xfrm>
+            <a:off x="424371" y="3789082"/>
+            <a:ext cx="1073150" cy="261610"/>
           </a:xfrm>
           <a:prstGeom prst="rect">
             <a:avLst/>
@@ -4097,13 +4092,129 @@
             </a:ext>
           </a:extLst>
         </p:spPr>
-      </p:pic>
-      <p:sp>
-        <p:nvSpPr>
-          <p:cNvPr id="91" name="TextBox 39">
+        <p:txBody>
+          <a:bodyPr>
+            <a:spAutoFit/>
+          </a:bodyPr>
+          <a:lstStyle>
+            <a:lvl1pPr>
+              <a:defRPr>
+                <a:solidFill>
+                  <a:schemeClr val="tx1"/>
+                </a:solidFill>
+                <a:latin typeface="Calibri" panose="020F0502020204030204" pitchFamily="34" charset="0"/>
+              </a:defRPr>
+            </a:lvl1pPr>
+            <a:lvl2pPr marL="742950" indent="-285750">
+              <a:defRPr>
+                <a:solidFill>
+                  <a:schemeClr val="tx1"/>
+                </a:solidFill>
+                <a:latin typeface="Calibri" panose="020F0502020204030204" pitchFamily="34" charset="0"/>
+              </a:defRPr>
+            </a:lvl2pPr>
+            <a:lvl3pPr marL="1143000" indent="-228600">
+              <a:defRPr>
+                <a:solidFill>
+                  <a:schemeClr val="tx1"/>
+                </a:solidFill>
+                <a:latin typeface="Calibri" panose="020F0502020204030204" pitchFamily="34" charset="0"/>
+              </a:defRPr>
+            </a:lvl3pPr>
+            <a:lvl4pPr marL="1600200" indent="-228600">
+              <a:defRPr>
+                <a:solidFill>
+                  <a:schemeClr val="tx1"/>
+                </a:solidFill>
+                <a:latin typeface="Calibri" panose="020F0502020204030204" pitchFamily="34" charset="0"/>
+              </a:defRPr>
+            </a:lvl4pPr>
+            <a:lvl5pPr marL="2057400" indent="-228600">
+              <a:defRPr>
+                <a:solidFill>
+                  <a:schemeClr val="tx1"/>
+                </a:solidFill>
+                <a:latin typeface="Calibri" panose="020F0502020204030204" pitchFamily="34" charset="0"/>
+              </a:defRPr>
+            </a:lvl5pPr>
+            <a:lvl6pPr marL="2514600" indent="-228600" eaLnBrk="0" fontAlgn="base" hangingPunct="0">
+              <a:spcBef>
+                <a:spcPct val="0"/>
+              </a:spcBef>
+              <a:spcAft>
+                <a:spcPct val="0"/>
+              </a:spcAft>
+              <a:defRPr>
+                <a:solidFill>
+                  <a:schemeClr val="tx1"/>
+                </a:solidFill>
+                <a:latin typeface="Calibri" panose="020F0502020204030204" pitchFamily="34" charset="0"/>
+              </a:defRPr>
+            </a:lvl6pPr>
+            <a:lvl7pPr marL="2971800" indent="-228600" eaLnBrk="0" fontAlgn="base" hangingPunct="0">
+              <a:spcBef>
+                <a:spcPct val="0"/>
+              </a:spcBef>
+              <a:spcAft>
+                <a:spcPct val="0"/>
+              </a:spcAft>
+              <a:defRPr>
+                <a:solidFill>
+                  <a:schemeClr val="tx1"/>
+                </a:solidFill>
+                <a:latin typeface="Calibri" panose="020F0502020204030204" pitchFamily="34" charset="0"/>
+              </a:defRPr>
+            </a:lvl7pPr>
+            <a:lvl8pPr marL="3429000" indent="-228600" eaLnBrk="0" fontAlgn="base" hangingPunct="0">
+              <a:spcBef>
+                <a:spcPct val="0"/>
+              </a:spcBef>
+              <a:spcAft>
+                <a:spcPct val="0"/>
+              </a:spcAft>
+              <a:defRPr>
+                <a:solidFill>
+                  <a:schemeClr val="tx1"/>
+                </a:solidFill>
+                <a:latin typeface="Calibri" panose="020F0502020204030204" pitchFamily="34" charset="0"/>
+              </a:defRPr>
+            </a:lvl8pPr>
+            <a:lvl9pPr marL="3886200" indent="-228600" eaLnBrk="0" fontAlgn="base" hangingPunct="0">
+              <a:spcBef>
+                <a:spcPct val="0"/>
+              </a:spcBef>
+              <a:spcAft>
+                <a:spcPct val="0"/>
+              </a:spcAft>
+              <a:defRPr>
+                <a:solidFill>
+                  <a:schemeClr val="tx1"/>
+                </a:solidFill>
+                <a:latin typeface="Calibri" panose="020F0502020204030204" pitchFamily="34" charset="0"/>
+              </a:defRPr>
+            </a:lvl9pPr>
+          </a:lstStyle>
+          <a:p>
+            <a:pPr algn="ctr" eaLnBrk="1" hangingPunct="1"/>
+            <a:r>
+              <a:rPr lang="en-US" altLang="en-US" sz="1100" dirty="0">
+                <a:solidFill>
+                  <a:srgbClr val="000000"/>
+                </a:solidFill>
+                <a:latin typeface="Arial" panose="020B0604020202020204" pitchFamily="34" charset="0"/>
+                <a:cs typeface="Arial" panose="020B0604020202020204" pitchFamily="34" charset="0"/>
+              </a:rPr>
+              <a:t>Administrator</a:t>
+            </a:r>
+          </a:p>
+        </p:txBody>
+      </p:sp>
+      <p:sp>
+        <p:nvSpPr>
+          <p:cNvPr id="92" name="TextBox 40">
             <a:extLst>
               <a:ext uri="{FF2B5EF4-FFF2-40B4-BE49-F238E27FC236}">
-                <a16:creationId xmlns:a16="http://schemas.microsoft.com/office/drawing/2014/main" id="{46B93558-74DF-4C78-8B3B-26CE09B26DAF}"/>
+                <a16:creationId xmlns:a16="http://schemas.microsoft.com/office/drawing/2014/main" id="{B5816178-B8D8-4B01-BCD1-E6A15C877AAA}"/>
               </a:ext>
             </a:extLst>
           </p:cNvPr>
@@ -4114,7 +4225,7 @@
         </p:nvSpPr>
         <p:spPr bwMode="auto">
           <a:xfrm>
-            <a:off x="424371" y="3789082"/>
+            <a:off x="429451" y="4627284"/>
             <a:ext cx="1073150" cy="261610"/>
           </a:xfrm>
           <a:prstGeom prst="rect">
@@ -4256,17 +4367,17 @@
                 <a:latin typeface="Arial" panose="020B0604020202020204" pitchFamily="34" charset="0"/>
                 <a:cs typeface="Arial" panose="020B0604020202020204" pitchFamily="34" charset="0"/>
               </a:rPr>
-              <a:t>Administrator</a:t>
-            </a:r>
-          </a:p>
-        </p:txBody>
-      </p:sp>
-      <p:sp>
-        <p:nvSpPr>
-          <p:cNvPr id="92" name="TextBox 40">
+              <a:t>Users</a:t>
+            </a:r>
+          </a:p>
+        </p:txBody>
+      </p:sp>
+      <p:sp>
+        <p:nvSpPr>
+          <p:cNvPr id="93" name="TextBox 26">
             <a:extLst>
               <a:ext uri="{FF2B5EF4-FFF2-40B4-BE49-F238E27FC236}">
-                <a16:creationId xmlns:a16="http://schemas.microsoft.com/office/drawing/2014/main" id="{B5816178-B8D8-4B01-BCD1-E6A15C877AAA}"/>
+                <a16:creationId xmlns:a16="http://schemas.microsoft.com/office/drawing/2014/main" id="{9CA3689B-0EEE-495D-8754-D5EF4140936B}"/>
               </a:ext>
             </a:extLst>
           </p:cNvPr>
@@ -4277,8 +4388,8 @@
         </p:nvSpPr>
         <p:spPr bwMode="auto">
           <a:xfrm>
-            <a:off x="429451" y="4627284"/>
-            <a:ext cx="1073150" cy="261610"/>
+            <a:off x="1944299" y="7265541"/>
+            <a:ext cx="1847848" cy="430887"/>
           </a:xfrm>
           <a:prstGeom prst="rect">
             <a:avLst/>
@@ -4308,7 +4419,7 @@
           </a:extLst>
         </p:spPr>
         <p:txBody>
-          <a:bodyPr>
+          <a:bodyPr wrap="square" lIns="0" rIns="0">
             <a:spAutoFit/>
           </a:bodyPr>
           <a:lstStyle>
@@ -4413,35 +4524,57 @@
             <a:pPr algn="ctr" eaLnBrk="1" hangingPunct="1"/>
             <a:r>
               <a:rPr lang="en-US" altLang="en-US" sz="1100" dirty="0">
-                <a:solidFill>
-                  <a:srgbClr val="000000"/>
-                </a:solidFill>
                 <a:latin typeface="Arial" panose="020B0604020202020204" pitchFamily="34" charset="0"/>
+                <a:ea typeface="Amazon Ember" panose="020B0603020204020204" pitchFamily="34" charset="0"/>
                 <a:cs typeface="Arial" panose="020B0604020202020204" pitchFamily="34" charset="0"/>
               </a:rPr>
-              <a:t>Users</a:t>
-            </a:r>
-          </a:p>
-        </p:txBody>
-      </p:sp>
-      <p:sp>
-        <p:nvSpPr>
-          <p:cNvPr id="93" name="TextBox 26">
+              <a:t>VMware</a:t>
+            </a:r>
+          </a:p>
+          <a:p>
+            <a:pPr algn="ctr" eaLnBrk="1" hangingPunct="1"/>
+            <a:r>
+              <a:rPr lang="en-US" altLang="en-US" sz="1100" dirty="0">
+                <a:latin typeface="Arial" panose="020B0604020202020204" pitchFamily="34" charset="0"/>
+                <a:ea typeface="Amazon Ember" panose="020B0603020204020204" pitchFamily="34" charset="0"/>
+                <a:cs typeface="Arial" panose="020B0604020202020204" pitchFamily="34" charset="0"/>
+              </a:rPr>
+              <a:t>Tanzu Application Platform</a:t>
+            </a:r>
+          </a:p>
+        </p:txBody>
+      </p:sp>
+      <p:pic>
+        <p:nvPicPr>
+          <p:cNvPr id="94" name="Graphic 34">
             <a:extLst>
               <a:ext uri="{FF2B5EF4-FFF2-40B4-BE49-F238E27FC236}">
-                <a16:creationId xmlns:a16="http://schemas.microsoft.com/office/drawing/2014/main" id="{9CA3689B-0EEE-495D-8754-D5EF4140936B}"/>
+                <a16:creationId xmlns:a16="http://schemas.microsoft.com/office/drawing/2014/main" id="{0F26936B-2228-40BB-85E3-6227A576C394}"/>
               </a:ext>
             </a:extLst>
           </p:cNvPr>
-          <p:cNvSpPr txBox="1">
-            <a:spLocks noChangeArrowheads="1"/>
-          </p:cNvSpPr>
+          <p:cNvPicPr>
+            <a:picLocks noChangeAspect="1" noChangeArrowheads="1"/>
+          </p:cNvPicPr>
           <p:nvPr/>
-        </p:nvSpPr>
+        </p:nvPicPr>
+        <p:blipFill>
+          <a:blip r:embed="rId15">
+            <a:extLst>
+              <a:ext uri="{28A0092B-C50C-407E-A947-70E740481C1C}">
+                <a14:useLocalDpi xmlns:a14="http://schemas.microsoft.com/office/drawing/2010/main" val="0"/>
+              </a:ext>
+            </a:extLst>
+          </a:blip>
+          <a:srcRect/>
+          <a:stretch>
+            <a:fillRect/>
+          </a:stretch>
+        </p:blipFill>
         <p:spPr bwMode="auto">
           <a:xfrm>
-            <a:off x="1944299" y="7265541"/>
-            <a:ext cx="1847848" cy="430887"/>
+            <a:off x="2643222" y="6886419"/>
+            <a:ext cx="457200" cy="457200"/>
           </a:xfrm>
           <a:prstGeom prst="rect">
             <a:avLst/>
@@ -4470,138 +4603,13 @@
             </a:ext>
           </a:extLst>
         </p:spPr>
-        <p:txBody>
-          <a:bodyPr wrap="square" lIns="0" rIns="0">
-            <a:spAutoFit/>
-          </a:bodyPr>
-          <a:lstStyle>
-            <a:lvl1pPr>
-              <a:defRPr>
-                <a:solidFill>
-                  <a:schemeClr val="tx1"/>
-                </a:solidFill>
-                <a:latin typeface="Calibri" panose="020F0502020204030204" pitchFamily="34" charset="0"/>
-              </a:defRPr>
-            </a:lvl1pPr>
-            <a:lvl2pPr marL="742950" indent="-285750">
-              <a:defRPr>
-                <a:solidFill>
-                  <a:schemeClr val="tx1"/>
-                </a:solidFill>
-                <a:latin typeface="Calibri" panose="020F0502020204030204" pitchFamily="34" charset="0"/>
-              </a:defRPr>
-            </a:lvl2pPr>
-            <a:lvl3pPr marL="1143000" indent="-228600">
-              <a:defRPr>
-                <a:solidFill>
-                  <a:schemeClr val="tx1"/>
-                </a:solidFill>
-                <a:latin typeface="Calibri" panose="020F0502020204030204" pitchFamily="34" charset="0"/>
-              </a:defRPr>
-            </a:lvl3pPr>
-            <a:lvl4pPr marL="1600200" indent="-228600">
-              <a:defRPr>
-                <a:solidFill>
-                  <a:schemeClr val="tx1"/>
-                </a:solidFill>
-                <a:latin typeface="Calibri" panose="020F0502020204030204" pitchFamily="34" charset="0"/>
-              </a:defRPr>
-            </a:lvl4pPr>
-            <a:lvl5pPr marL="2057400" indent="-228600">
-              <a:defRPr>
-                <a:solidFill>
-                  <a:schemeClr val="tx1"/>
-                </a:solidFill>
-                <a:latin typeface="Calibri" panose="020F0502020204030204" pitchFamily="34" charset="0"/>
-              </a:defRPr>
-            </a:lvl5pPr>
-            <a:lvl6pPr marL="2514600" indent="-228600" eaLnBrk="0" fontAlgn="base" hangingPunct="0">
-              <a:spcBef>
-                <a:spcPct val="0"/>
-              </a:spcBef>
-              <a:spcAft>
-                <a:spcPct val="0"/>
-              </a:spcAft>
-              <a:defRPr>
-                <a:solidFill>
-                  <a:schemeClr val="tx1"/>
-                </a:solidFill>
-                <a:latin typeface="Calibri" panose="020F0502020204030204" pitchFamily="34" charset="0"/>
-              </a:defRPr>
-            </a:lvl6pPr>
-            <a:lvl7pPr marL="2971800" indent="-228600" eaLnBrk="0" fontAlgn="base" hangingPunct="0">
-              <a:spcBef>
-                <a:spcPct val="0"/>
-              </a:spcBef>
-              <a:spcAft>
-                <a:spcPct val="0"/>
-              </a:spcAft>
-              <a:defRPr>
-                <a:solidFill>
-                  <a:schemeClr val="tx1"/>
-                </a:solidFill>
-                <a:latin typeface="Calibri" panose="020F0502020204030204" pitchFamily="34" charset="0"/>
-              </a:defRPr>
-            </a:lvl7pPr>
-            <a:lvl8pPr marL="3429000" indent="-228600" eaLnBrk="0" fontAlgn="base" hangingPunct="0">
-              <a:spcBef>
-                <a:spcPct val="0"/>
-              </a:spcBef>
-              <a:spcAft>
-                <a:spcPct val="0"/>
-              </a:spcAft>
-              <a:defRPr>
-                <a:solidFill>
-                  <a:schemeClr val="tx1"/>
-                </a:solidFill>
-                <a:latin typeface="Calibri" panose="020F0502020204030204" pitchFamily="34" charset="0"/>
-              </a:defRPr>
-            </a:lvl8pPr>
-            <a:lvl9pPr marL="3886200" indent="-228600" eaLnBrk="0" fontAlgn="base" hangingPunct="0">
-              <a:spcBef>
-                <a:spcPct val="0"/>
-              </a:spcBef>
-              <a:spcAft>
-                <a:spcPct val="0"/>
-              </a:spcAft>
-              <a:defRPr>
-                <a:solidFill>
-                  <a:schemeClr val="tx1"/>
-                </a:solidFill>
-                <a:latin typeface="Calibri" panose="020F0502020204030204" pitchFamily="34" charset="0"/>
-              </a:defRPr>
-            </a:lvl9pPr>
-          </a:lstStyle>
-          <a:p>
-            <a:pPr algn="ctr" eaLnBrk="1" hangingPunct="1"/>
-            <a:r>
-              <a:rPr lang="en-US" altLang="en-US" sz="1100" dirty="0">
-                <a:latin typeface="Arial" panose="020B0604020202020204" pitchFamily="34" charset="0"/>
-                <a:ea typeface="Amazon Ember" panose="020B0603020204020204" pitchFamily="34" charset="0"/>
-                <a:cs typeface="Arial" panose="020B0604020202020204" pitchFamily="34" charset="0"/>
-              </a:rPr>
-              <a:t>VMware</a:t>
-            </a:r>
-          </a:p>
-          <a:p>
-            <a:pPr algn="ctr" eaLnBrk="1" hangingPunct="1"/>
-            <a:r>
-              <a:rPr lang="en-US" altLang="en-US" sz="1100" dirty="0">
-                <a:latin typeface="Arial" panose="020B0604020202020204" pitchFamily="34" charset="0"/>
-                <a:ea typeface="Amazon Ember" panose="020B0603020204020204" pitchFamily="34" charset="0"/>
-                <a:cs typeface="Arial" panose="020B0604020202020204" pitchFamily="34" charset="0"/>
-              </a:rPr>
-              <a:t>Tanzu Application Platform</a:t>
-            </a:r>
-          </a:p>
-        </p:txBody>
-      </p:sp>
+      </p:pic>
       <p:pic>
         <p:nvPicPr>
-          <p:cNvPr id="94" name="Graphic 34">
+          <p:cNvPr id="95" name="Graphic 60">
             <a:extLst>
               <a:ext uri="{FF2B5EF4-FFF2-40B4-BE49-F238E27FC236}">
-                <a16:creationId xmlns:a16="http://schemas.microsoft.com/office/drawing/2014/main" id="{0F26936B-2228-40BB-85E3-6227A576C394}"/>
+                <a16:creationId xmlns:a16="http://schemas.microsoft.com/office/drawing/2014/main" id="{A1BE6915-FD35-4B6B-B1F7-791A3F39911F}"/>
               </a:ext>
             </a:extLst>
           </p:cNvPr>
@@ -4625,7 +4633,7 @@
         </p:blipFill>
         <p:spPr bwMode="auto">
           <a:xfrm>
-            <a:off x="2643222" y="6886419"/>
+            <a:off x="2638080" y="3321498"/>
             <a:ext cx="457200" cy="457200"/>
           </a:xfrm>
           <a:prstGeom prst="rect">
@@ -4656,37 +4664,24 @@
           </a:extLst>
         </p:spPr>
       </p:pic>
-      <p:pic>
-        <p:nvPicPr>
-          <p:cNvPr id="95" name="Graphic 60">
+      <p:sp>
+        <p:nvSpPr>
+          <p:cNvPr id="96" name="TextBox 16">
             <a:extLst>
               <a:ext uri="{FF2B5EF4-FFF2-40B4-BE49-F238E27FC236}">
-                <a16:creationId xmlns:a16="http://schemas.microsoft.com/office/drawing/2014/main" id="{A1BE6915-FD35-4B6B-B1F7-791A3F39911F}"/>
+                <a16:creationId xmlns:a16="http://schemas.microsoft.com/office/drawing/2014/main" id="{995889A9-310B-4A4B-BA55-9EDC39944B45}"/>
               </a:ext>
             </a:extLst>
           </p:cNvPr>
-          <p:cNvPicPr>
-            <a:picLocks noChangeAspect="1" noChangeArrowheads="1"/>
-          </p:cNvPicPr>
+          <p:cNvSpPr txBox="1">
+            <a:spLocks noChangeArrowheads="1"/>
+          </p:cNvSpPr>
           <p:nvPr/>
-        </p:nvPicPr>
-        <p:blipFill>
-          <a:blip r:embed="rId17">
-            <a:extLst>
-              <a:ext uri="{28A0092B-C50C-407E-A947-70E740481C1C}">
-                <a14:useLocalDpi xmlns:a14="http://schemas.microsoft.com/office/drawing/2010/main" val="0"/>
-              </a:ext>
-            </a:extLst>
-          </a:blip>
-          <a:srcRect/>
-          <a:stretch>
-            <a:fillRect/>
-          </a:stretch>
-        </p:blipFill>
+        </p:nvSpPr>
         <p:spPr bwMode="auto">
           <a:xfrm>
-            <a:off x="2638080" y="3321498"/>
-            <a:ext cx="457200" cy="457200"/>
+            <a:off x="1831415" y="3789082"/>
+            <a:ext cx="2090060" cy="261610"/>
           </a:xfrm>
           <a:prstGeom prst="rect">
             <a:avLst/>
@@ -4715,53 +4710,6 @@
             </a:ext>
           </a:extLst>
         </p:spPr>
-      </p:pic>
-      <p:sp>
-        <p:nvSpPr>
-          <p:cNvPr id="96" name="TextBox 16">
-            <a:extLst>
-              <a:ext uri="{FF2B5EF4-FFF2-40B4-BE49-F238E27FC236}">
-                <a16:creationId xmlns:a16="http://schemas.microsoft.com/office/drawing/2014/main" id="{995889A9-310B-4A4B-BA55-9EDC39944B45}"/>
-              </a:ext>
-            </a:extLst>
-          </p:cNvPr>
-          <p:cNvSpPr txBox="1">
-            <a:spLocks noChangeArrowheads="1"/>
-          </p:cNvSpPr>
-          <p:nvPr/>
-        </p:nvSpPr>
-        <p:spPr bwMode="auto">
-          <a:xfrm>
-            <a:off x="1831415" y="3789082"/>
-            <a:ext cx="2090060" cy="261610"/>
-          </a:xfrm>
-          <a:prstGeom prst="rect">
-            <a:avLst/>
-          </a:prstGeom>
-          <a:noFill/>
-          <a:ln>
-            <a:noFill/>
-          </a:ln>
-          <a:extLst>
-            <a:ext uri="{909E8E84-426E-40DD-AFC4-6F175D3DCCD1}">
-              <a14:hiddenFill xmlns:a14="http://schemas.microsoft.com/office/drawing/2010/main">
-                <a:solidFill>
-                  <a:srgbClr val="FFFFFF"/>
-                </a:solidFill>
-              </a14:hiddenFill>
-            </a:ext>
-            <a:ext uri="{91240B29-F687-4F45-9708-019B960494DF}">
-              <a14:hiddenLine xmlns:a14="http://schemas.microsoft.com/office/drawing/2010/main" w="9525">
-                <a:solidFill>
-                  <a:srgbClr val="000000"/>
-                </a:solidFill>
-                <a:miter lim="800000"/>
-                <a:headEnd/>
-                <a:tailEnd/>
-              </a14:hiddenLine>
-            </a:ext>
-          </a:extLst>
-        </p:spPr>
         <p:txBody>
           <a:bodyPr wrap="square" lIns="0" rIns="0">
             <a:spAutoFit/>
@@ -4892,10 +4840,10 @@
           <p:nvPr/>
         </p:nvPicPr>
         <p:blipFill>
-          <a:blip r:embed="rId18">
+          <a:blip r:embed="rId17">
             <a:extLst>
               <a:ext uri="{96DAC541-7B7A-43D3-8B79-37D633B846F1}">
-                <asvg:svgBlip xmlns:asvg="http://schemas.microsoft.com/office/drawing/2016/SVG/main" r:embed="rId19"/>
+                <asvg:svgBlip xmlns:asvg="http://schemas.microsoft.com/office/drawing/2016/SVG/main" r:embed="rId18"/>
               </a:ext>
             </a:extLst>
           </a:blip>
@@ -4928,7 +4876,7 @@
           <p:nvPr/>
         </p:nvPicPr>
         <p:blipFill>
-          <a:blip r:embed="rId17">
+          <a:blip r:embed="rId16">
             <a:extLst>
               <a:ext uri="{28A0092B-C50C-407E-A947-70E740481C1C}">
                 <a14:useLocalDpi xmlns:a14="http://schemas.microsoft.com/office/drawing/2010/main" val="0"/>
@@ -5240,14 +5188,14 @@
           <p:cNvCxnSpPr>
             <a:cxnSpLocks/>
             <a:stCxn id="98" idx="3"/>
-            <a:endCxn id="88" idx="1"/>
+            <a:endCxn id="73" idx="1"/>
           </p:cNvCxnSpPr>
           <p:nvPr/>
         </p:nvCxnSpPr>
         <p:spPr>
           <a:xfrm>
             <a:off x="3097825" y="4365399"/>
-            <a:ext cx="1557960" cy="0"/>
+            <a:ext cx="1562472" cy="0"/>
           </a:xfrm>
           <a:prstGeom prst="straightConnector1">
             <a:avLst/>
@@ -5290,7 +5238,7 @@
           <p:nvPr/>
         </p:nvPicPr>
         <p:blipFill>
-          <a:blip r:embed="rId20">
+          <a:blip r:embed="rId19">
             <a:extLst>
               <a:ext uri="{28A0092B-C50C-407E-A947-70E740481C1C}">
                 <a14:useLocalDpi xmlns:a14="http://schemas.microsoft.com/office/drawing/2010/main" val="0"/>
@@ -5581,10 +5529,10 @@
           <p:nvPr/>
         </p:nvPicPr>
         <p:blipFill>
-          <a:blip r:embed="rId21">
+          <a:blip r:embed="rId20">
             <a:extLst>
               <a:ext uri="{96DAC541-7B7A-43D3-8B79-37D633B846F1}">
-                <asvg:svgBlip xmlns:asvg="http://schemas.microsoft.com/office/drawing/2016/SVG/main" r:embed="rId22"/>
+                <asvg:svgBlip xmlns:asvg="http://schemas.microsoft.com/office/drawing/2016/SVG/main" r:embed="rId21"/>
               </a:ext>
             </a:extLst>
           </a:blip>
@@ -6348,7 +6296,7 @@
           <p:nvPr/>
         </p:nvPicPr>
         <p:blipFill>
-          <a:blip r:embed="rId16">
+          <a:blip r:embed="rId15">
             <a:extLst>
               <a:ext uri="{28A0092B-C50C-407E-A947-70E740481C1C}">
                 <a14:useLocalDpi xmlns:a14="http://schemas.microsoft.com/office/drawing/2010/main" val="0"/>
@@ -6408,7 +6356,7 @@
           <p:nvPr/>
         </p:nvPicPr>
         <p:blipFill>
-          <a:blip r:embed="rId20">
+          <a:blip r:embed="rId19">
             <a:extLst>
               <a:ext uri="{28A0092B-C50C-407E-A947-70E740481C1C}">
                 <a14:useLocalDpi xmlns:a14="http://schemas.microsoft.com/office/drawing/2010/main" val="0"/>
@@ -6538,10 +6486,10 @@
           <p:nvPr/>
         </p:nvPicPr>
         <p:blipFill>
-          <a:blip r:embed="rId21">
+          <a:blip r:embed="rId20">
             <a:extLst>
               <a:ext uri="{96DAC541-7B7A-43D3-8B79-37D633B846F1}">
-                <asvg:svgBlip xmlns:asvg="http://schemas.microsoft.com/office/drawing/2016/SVG/main" r:embed="rId22"/>
+                <asvg:svgBlip xmlns:asvg="http://schemas.microsoft.com/office/drawing/2016/SVG/main" r:embed="rId21"/>
               </a:ext>
             </a:extLst>
           </a:blip>
@@ -7281,7 +7229,7 @@
           <p:nvPr/>
         </p:nvPicPr>
         <p:blipFill>
-          <a:blip r:embed="rId16">
+          <a:blip r:embed="rId15">
             <a:extLst>
               <a:ext uri="{28A0092B-C50C-407E-A947-70E740481C1C}">
                 <a14:useLocalDpi xmlns:a14="http://schemas.microsoft.com/office/drawing/2010/main" val="0"/>
@@ -7341,7 +7289,7 @@
           <p:nvPr/>
         </p:nvPicPr>
         <p:blipFill>
-          <a:blip r:embed="rId20">
+          <a:blip r:embed="rId19">
             <a:extLst>
               <a:ext uri="{28A0092B-C50C-407E-A947-70E740481C1C}">
                 <a14:useLocalDpi xmlns:a14="http://schemas.microsoft.com/office/drawing/2010/main" val="0"/>
@@ -7471,10 +7419,10 @@
           <p:nvPr/>
         </p:nvPicPr>
         <p:blipFill>
-          <a:blip r:embed="rId21">
+          <a:blip r:embed="rId20">
             <a:extLst>
               <a:ext uri="{96DAC541-7B7A-43D3-8B79-37D633B846F1}">
-                <asvg:svgBlip xmlns:asvg="http://schemas.microsoft.com/office/drawing/2016/SVG/main" r:embed="rId22"/>
+                <asvg:svgBlip xmlns:asvg="http://schemas.microsoft.com/office/drawing/2016/SVG/main" r:embed="rId21"/>
               </a:ext>
             </a:extLst>
           </a:blip>
@@ -7679,10 +7627,10 @@
           <p:nvPr/>
         </p:nvPicPr>
         <p:blipFill>
-          <a:blip r:embed="rId23">
+          <a:blip r:embed="rId22">
             <a:extLst>
               <a:ext uri="{96DAC541-7B7A-43D3-8B79-37D633B846F1}">
-                <asvg:svgBlip xmlns:asvg="http://schemas.microsoft.com/office/drawing/2016/SVG/main" r:embed="rId24"/>
+                <asvg:svgBlip xmlns:asvg="http://schemas.microsoft.com/office/drawing/2016/SVG/main" r:embed="rId23"/>
               </a:ext>
             </a:extLst>
           </a:blip>
@@ -7737,7 +7685,7 @@
           <p:nvPr/>
         </p:nvPicPr>
         <p:blipFill>
-          <a:blip r:embed="rId25">
+          <a:blip r:embed="rId24">
             <a:extLst>
               <a:ext uri="{28A0092B-C50C-407E-A947-70E740481C1C}">
                 <a14:useLocalDpi xmlns:a14="http://schemas.microsoft.com/office/drawing/2010/main" val="0"/>
@@ -7958,7 +7906,7 @@
           <p:nvPr/>
         </p:nvPicPr>
         <p:blipFill>
-          <a:blip r:embed="rId26">
+          <a:blip r:embed="rId25">
             <a:extLst>
               <a:ext uri="{28A0092B-C50C-407E-A947-70E740481C1C}">
                 <a14:useLocalDpi xmlns:a14="http://schemas.microsoft.com/office/drawing/2010/main" val="0"/>
@@ -8179,7 +8127,7 @@
           <p:nvPr/>
         </p:nvPicPr>
         <p:blipFill>
-          <a:blip r:embed="rId27">
+          <a:blip r:embed="rId26">
             <a:extLst>
               <a:ext uri="{28A0092B-C50C-407E-A947-70E740481C1C}">
                 <a14:useLocalDpi xmlns:a14="http://schemas.microsoft.com/office/drawing/2010/main" val="0"/>
@@ -8722,7 +8670,7 @@
           <p:nvPr/>
         </p:nvPicPr>
         <p:blipFill>
-          <a:blip r:embed="rId28">
+          <a:blip r:embed="rId27">
             <a:extLst>
               <a:ext uri="{28A0092B-C50C-407E-A947-70E740481C1C}">
                 <a14:useLocalDpi xmlns:a14="http://schemas.microsoft.com/office/drawing/2010/main" val="0"/>
@@ -8928,6 +8876,66 @@
           </a:p>
         </p:txBody>
       </p:sp>
+      <p:pic>
+        <p:nvPicPr>
+          <p:cNvPr id="73" name="Graphic 24">
+            <a:extLst>
+              <a:ext uri="{FF2B5EF4-FFF2-40B4-BE49-F238E27FC236}">
+                <a16:creationId xmlns:a16="http://schemas.microsoft.com/office/drawing/2014/main" id="{47D442D6-72D6-4155-8FBC-43A6E85517CE}"/>
+              </a:ext>
+            </a:extLst>
+          </p:cNvPr>
+          <p:cNvPicPr>
+            <a:picLocks noChangeAspect="1" noChangeArrowheads="1"/>
+          </p:cNvPicPr>
+          <p:nvPr/>
+        </p:nvPicPr>
+        <p:blipFill>
+          <a:blip r:embed="rId28">
+            <a:extLst>
+              <a:ext uri="{28A0092B-C50C-407E-A947-70E740481C1C}">
+                <a14:useLocalDpi xmlns:a14="http://schemas.microsoft.com/office/drawing/2010/main" val="0"/>
+              </a:ext>
+            </a:extLst>
+          </a:blip>
+          <a:srcRect/>
+          <a:stretch>
+            <a:fillRect/>
+          </a:stretch>
+        </p:blipFill>
+        <p:spPr bwMode="auto">
+          <a:xfrm>
+            <a:off x="4660297" y="4136799"/>
+            <a:ext cx="457200" cy="457200"/>
+          </a:xfrm>
+          <a:prstGeom prst="rect">
+            <a:avLst/>
+          </a:prstGeom>
+          <a:noFill/>
+          <a:ln>
+            <a:noFill/>
+          </a:ln>
+          <a:extLst>
+            <a:ext uri="{909E8E84-426E-40DD-AFC4-6F175D3DCCD1}">
+              <a14:hiddenFill xmlns:a14="http://schemas.microsoft.com/office/drawing/2010/main">
+                <a:solidFill>
+                  <a:srgbClr val="FFFFFF"/>
+                </a:solidFill>
+              </a14:hiddenFill>
+            </a:ext>
+            <a:ext uri="{91240B29-F687-4F45-9708-019B960494DF}">
+              <a14:hiddenLine xmlns:a14="http://schemas.microsoft.com/office/drawing/2010/main" w="9525">
+                <a:solidFill>
+                  <a:srgbClr val="000000"/>
+                </a:solidFill>
+                <a:miter lim="800000"/>
+                <a:headEnd/>
+                <a:tailEnd/>
+              </a14:hiddenLine>
+            </a:ext>
+          </a:extLst>
+        </p:spPr>
+      </p:pic>
     </p:spTree>
     <p:extLst>
       <p:ext uri="{BB962C8B-B14F-4D97-AF65-F5344CB8AC3E}">

</xml_diff>